<commit_message>
Fixes and updates on Queries Forms and Reports slides
</commit_message>
<xml_diff>
--- a/Courses/Software-Sciences/Module-3-Databases-New/13-MS-Access/13-MS-Access-Queries-Forms-Reports.pptx
+++ b/Courses/Software-Sciences/Module-3-Databases-New/13-MS-Access/13-MS-Access-Queries-Forms-Reports.pptx
@@ -5,10 +5,10 @@
     <p:sldMasterId id="2147483675" r:id="rId1"/>
   </p:sldMasterIdLst>
   <p:notesMasterIdLst>
-    <p:notesMasterId r:id="rId39"/>
+    <p:notesMasterId r:id="rId40"/>
   </p:notesMasterIdLst>
   <p:handoutMasterIdLst>
-    <p:handoutMasterId r:id="rId40"/>
+    <p:handoutMasterId r:id="rId41"/>
   </p:handoutMasterIdLst>
   <p:sldIdLst>
     <p:sldId id="503" r:id="rId2"/>
@@ -28,26 +28,27 @@
     <p:sldId id="587" r:id="rId16"/>
     <p:sldId id="559" r:id="rId17"/>
     <p:sldId id="560" r:id="rId18"/>
-    <p:sldId id="542" r:id="rId19"/>
-    <p:sldId id="543" r:id="rId20"/>
-    <p:sldId id="544" r:id="rId21"/>
-    <p:sldId id="545" r:id="rId22"/>
-    <p:sldId id="546" r:id="rId23"/>
-    <p:sldId id="596" r:id="rId24"/>
-    <p:sldId id="548" r:id="rId25"/>
-    <p:sldId id="549" r:id="rId26"/>
-    <p:sldId id="550" r:id="rId27"/>
-    <p:sldId id="551" r:id="rId28"/>
-    <p:sldId id="552" r:id="rId29"/>
-    <p:sldId id="553" r:id="rId30"/>
-    <p:sldId id="554" r:id="rId31"/>
-    <p:sldId id="597" r:id="rId32"/>
-    <p:sldId id="598" r:id="rId33"/>
-    <p:sldId id="599" r:id="rId34"/>
-    <p:sldId id="600" r:id="rId35"/>
-    <p:sldId id="349" r:id="rId36"/>
-    <p:sldId id="504" r:id="rId37"/>
-    <p:sldId id="505" r:id="rId38"/>
+    <p:sldId id="601" r:id="rId19"/>
+    <p:sldId id="542" r:id="rId20"/>
+    <p:sldId id="543" r:id="rId21"/>
+    <p:sldId id="544" r:id="rId22"/>
+    <p:sldId id="545" r:id="rId23"/>
+    <p:sldId id="546" r:id="rId24"/>
+    <p:sldId id="596" r:id="rId25"/>
+    <p:sldId id="548" r:id="rId26"/>
+    <p:sldId id="549" r:id="rId27"/>
+    <p:sldId id="550" r:id="rId28"/>
+    <p:sldId id="551" r:id="rId29"/>
+    <p:sldId id="552" r:id="rId30"/>
+    <p:sldId id="553" r:id="rId31"/>
+    <p:sldId id="554" r:id="rId32"/>
+    <p:sldId id="597" r:id="rId33"/>
+    <p:sldId id="598" r:id="rId34"/>
+    <p:sldId id="599" r:id="rId35"/>
+    <p:sldId id="600" r:id="rId36"/>
+    <p:sldId id="349" r:id="rId37"/>
+    <p:sldId id="504" r:id="rId38"/>
+    <p:sldId id="505" r:id="rId39"/>
   </p:sldIdLst>
   <p:sldSz cx="12192000" cy="6858000"/>
   <p:notesSz cx="6858000" cy="9144000"/>
@@ -180,6 +181,7 @@
             <p14:sldId id="587"/>
             <p14:sldId id="559"/>
             <p14:sldId id="560"/>
+            <p14:sldId id="601"/>
           </p14:sldIdLst>
         </p14:section>
         <p14:section name="Формуляри" id="{770C0E03-2618-4D4B-B9EF-F2266180AA55}">
@@ -1143,7 +1145,7 @@
             <a:fld id="{3EBA5BD7-F043-4D1B-AA17-CD412FC534DE}" type="slidenum">
               <a:rPr lang="en-US" smtClean="0"/>
               <a:pPr/>
-              <a:t>35</a:t>
+              <a:t>36</a:t>
             </a:fld>
             <a:endParaRPr lang="en-US" dirty="0"/>
           </a:p>
@@ -1389,7 +1391,7 @@
             <a:fld id="{3EBA5BD7-F043-4D1B-AA17-CD412FC534DE}" type="slidenum">
               <a:rPr lang="en-US" smtClean="0"/>
               <a:pPr/>
-              <a:t>36</a:t>
+              <a:t>37</a:t>
             </a:fld>
             <a:endParaRPr lang="en-US" dirty="0"/>
           </a:p>
@@ -1635,7 +1637,7 @@
             <a:fld id="{3EBA5BD7-F043-4D1B-AA17-CD412FC534DE}" type="slidenum">
               <a:rPr lang="en-US" smtClean="0"/>
               <a:pPr/>
-              <a:t>37</a:t>
+              <a:t>38</a:t>
             </a:fld>
             <a:endParaRPr lang="en-US" dirty="0"/>
           </a:p>
@@ -2461,7 +2463,7 @@
             <a:fld id="{2BF067CD-8E6B-4360-9AA8-C5DF2A48A6D1}" type="slidenum">
               <a:rPr lang="en-US" smtClean="0"/>
               <a:pPr/>
-              <a:t>25</a:t>
+              <a:t>26</a:t>
             </a:fld>
             <a:endParaRPr lang="en-US" dirty="0"/>
           </a:p>
@@ -2600,7 +2602,7 @@
           <a:p>
             <a:fld id="{2BF067CD-8E6B-4360-9AA8-C5DF2A48A6D1}" type="slidenum">
               <a:rPr lang="en-US" smtClean="0"/>
-              <a:t>31</a:t>
+              <a:t>32</a:t>
             </a:fld>
             <a:endParaRPr lang="en-US" dirty="0"/>
           </a:p>
@@ -2721,7 +2723,7 @@
           <a:p>
             <a:fld id="{2BF067CD-8E6B-4360-9AA8-C5DF2A48A6D1}" type="slidenum">
               <a:rPr lang="en-US" smtClean="0"/>
-              <a:t>32</a:t>
+              <a:t>33</a:t>
             </a:fld>
             <a:endParaRPr lang="en-US" dirty="0"/>
           </a:p>
@@ -2842,7 +2844,7 @@
           <a:p>
             <a:fld id="{2BF067CD-8E6B-4360-9AA8-C5DF2A48A6D1}" type="slidenum">
               <a:rPr lang="en-US" smtClean="0"/>
-              <a:t>33</a:t>
+              <a:t>34</a:t>
             </a:fld>
             <a:endParaRPr lang="en-US" dirty="0"/>
           </a:p>
@@ -10835,7 +10837,10 @@
               <a:rPr lang="bg-BG" dirty="0"/>
               <a:t>Създаване на параметрична заявка</a:t>
             </a:r>
-            <a:endParaRPr lang="en-US" dirty="0"/>
+            <a:r>
+              <a:rPr lang="en-US" dirty="0"/>
+              <a:t> (1)</a:t>
+            </a:r>
           </a:p>
         </p:txBody>
       </p:sp>
@@ -11281,7 +11286,10 @@
               <a:rPr lang="bg-BG" dirty="0"/>
               <a:t>Създаване на параметрична заявка</a:t>
             </a:r>
-            <a:endParaRPr lang="en-US" dirty="0"/>
+            <a:r>
+              <a:rPr lang="en-US" dirty="0"/>
+              <a:t> (2)</a:t>
+            </a:r>
           </a:p>
         </p:txBody>
       </p:sp>
@@ -12211,6 +12219,519 @@
           <a:chExt cx="0" cy="0"/>
         </a:xfrm>
       </p:grpSpPr>
+      <p:sp>
+        <p:nvSpPr>
+          <p:cNvPr id="5" name="Slide Number">
+            <a:extLst>
+              <a:ext uri="{FF2B5EF4-FFF2-40B4-BE49-F238E27FC236}">
+                <a16:creationId xmlns:a16="http://schemas.microsoft.com/office/drawing/2014/main" id="{AB91DF2A-CEBA-0B9D-C6A3-9795284B3035}"/>
+              </a:ext>
+            </a:extLst>
+          </p:cNvPr>
+          <p:cNvSpPr>
+            <a:spLocks noGrp="1"/>
+          </p:cNvSpPr>
+          <p:nvPr>
+            <p:ph type="sldNum" sz="quarter" idx="5"/>
+          </p:nvPr>
+        </p:nvSpPr>
+        <p:spPr>
+          <a:xfrm>
+            <a:off x="11753030" y="6507000"/>
+            <a:ext cx="367414" cy="297000"/>
+          </a:xfrm>
+        </p:spPr>
+        <p:txBody>
+          <a:bodyPr vert="horz" lIns="91440" tIns="45720" rIns="91440" bIns="45720" rtlCol="0" anchor="b"/>
+          <a:lstStyle>
+            <a:lvl1pPr algn="r">
+              <a:defRPr sz="1000"/>
+            </a:lvl1pPr>
+          </a:lstStyle>
+          <a:p>
+            <a:fld id="{2BF067CD-8E6B-4360-9AA8-C5DF2A48A6D1}" type="slidenum">
+              <a:rPr lang="en-US" noProof="0" smtClean="0"/>
+              <a:pPr/>
+              <a:t>18</a:t>
+            </a:fld>
+            <a:endParaRPr lang="en-US" noProof="0" dirty="0"/>
+          </a:p>
+        </p:txBody>
+      </p:sp>
+      <p:sp>
+        <p:nvSpPr>
+          <p:cNvPr id="3" name="Text Placeholder 2"/>
+          <p:cNvSpPr>
+            <a:spLocks noGrp="1"/>
+          </p:cNvSpPr>
+          <p:nvPr>
+            <p:ph type="body" sz="quarter" idx="10"/>
+          </p:nvPr>
+        </p:nvSpPr>
+        <p:spPr>
+          <a:xfrm>
+            <a:off x="190402" y="1196125"/>
+            <a:ext cx="11818096" cy="5528766"/>
+          </a:xfrm>
+        </p:spPr>
+        <p:txBody>
+          <a:bodyPr/>
+          <a:lstStyle/>
+          <a:p>
+            <a:r>
+              <a:rPr lang="bg-BG" dirty="0"/>
+              <a:t>По този начин ще се </a:t>
+            </a:r>
+            <a:r>
+              <a:rPr lang="bg-BG" b="1" dirty="0"/>
+              <a:t>извлекат</a:t>
+            </a:r>
+            <a:r>
+              <a:rPr lang="bg-BG" dirty="0"/>
+              <a:t> </a:t>
+            </a:r>
+            <a:r>
+              <a:rPr lang="bg-BG" b="1" dirty="0"/>
+              <a:t>учениците</a:t>
+            </a:r>
+            <a:r>
+              <a:rPr lang="bg-BG" dirty="0"/>
+              <a:t>, чиито </a:t>
+            </a:r>
+            <a:r>
+              <a:rPr lang="bg-BG" b="1" dirty="0"/>
+              <a:t>години</a:t>
+            </a:r>
+            <a:r>
+              <a:rPr lang="bg-BG" dirty="0"/>
+              <a:t> са </a:t>
+            </a:r>
+            <a:r>
+              <a:rPr lang="bg-BG" b="1" dirty="0"/>
+              <a:t>повече</a:t>
+            </a:r>
+            <a:r>
+              <a:rPr lang="bg-BG" dirty="0"/>
+              <a:t> от </a:t>
+            </a:r>
+            <a:r>
+              <a:rPr lang="bg-BG" b="1" dirty="0"/>
+              <a:t>13</a:t>
+            </a:r>
+            <a:r>
+              <a:rPr lang="bg-BG" dirty="0"/>
+              <a:t>:</a:t>
+            </a:r>
+          </a:p>
+          <a:p>
+            <a:pPr lvl="1"/>
+            <a:endParaRPr lang="bg-BG" dirty="0"/>
+          </a:p>
+          <a:p>
+            <a:pPr lvl="1"/>
+            <a:endParaRPr lang="bg-BG" dirty="0"/>
+          </a:p>
+          <a:p>
+            <a:r>
+              <a:rPr lang="bg-BG" dirty="0"/>
+              <a:t>Чрез искане на входни данни </a:t>
+            </a:r>
+            <a:r>
+              <a:rPr lang="en-US" dirty="0"/>
+              <a:t>(</a:t>
+            </a:r>
+            <a:r>
+              <a:rPr lang="en-US" b="1" dirty="0">
+                <a:latin typeface="Consolas" panose="020B0609020204030204" pitchFamily="49" charset="0"/>
+              </a:rPr>
+              <a:t>[Age bigger than…]</a:t>
+            </a:r>
+            <a:r>
+              <a:rPr lang="en-US" dirty="0"/>
+              <a:t>) </a:t>
+            </a:r>
+            <a:r>
+              <a:rPr lang="bg-BG" b="1" dirty="0">
+                <a:solidFill>
+                  <a:schemeClr val="bg1"/>
+                </a:solidFill>
+              </a:rPr>
+              <a:t>потребителят</a:t>
+            </a:r>
+            <a:r>
+              <a:rPr lang="bg-BG" dirty="0"/>
+              <a:t> сам </a:t>
+            </a:r>
+            <a:r>
+              <a:rPr lang="bg-BG" b="1" dirty="0">
+                <a:solidFill>
+                  <a:schemeClr val="bg1"/>
+                </a:solidFill>
+              </a:rPr>
+              <a:t>избира</a:t>
+            </a:r>
+            <a:r>
+              <a:rPr lang="bg-BG" dirty="0"/>
+              <a:t> какво </a:t>
+            </a:r>
+            <a:r>
+              <a:rPr lang="bg-BG" b="1" dirty="0">
+                <a:solidFill>
+                  <a:schemeClr val="bg1"/>
+                </a:solidFill>
+              </a:rPr>
+              <a:t>число</a:t>
+            </a:r>
+            <a:r>
+              <a:rPr lang="bg-BG" dirty="0"/>
+              <a:t> за години да </a:t>
+            </a:r>
+            <a:r>
+              <a:rPr lang="bg-BG" b="1" dirty="0">
+                <a:solidFill>
+                  <a:schemeClr val="bg1"/>
+                </a:solidFill>
+              </a:rPr>
+              <a:t>въведе</a:t>
+            </a:r>
+            <a:r>
+              <a:rPr lang="bg-BG" dirty="0"/>
+              <a:t>:</a:t>
+            </a:r>
+          </a:p>
+        </p:txBody>
+      </p:sp>
+      <p:sp>
+        <p:nvSpPr>
+          <p:cNvPr id="4" name="Title 3"/>
+          <p:cNvSpPr>
+            <a:spLocks noGrp="1"/>
+          </p:cNvSpPr>
+          <p:nvPr>
+            <p:ph type="title"/>
+          </p:nvPr>
+        </p:nvSpPr>
+        <p:spPr>
+          <a:xfrm>
+            <a:off x="190406" y="100750"/>
+            <a:ext cx="10270594" cy="882654"/>
+          </a:xfrm>
+        </p:spPr>
+        <p:txBody>
+          <a:bodyPr/>
+          <a:lstStyle/>
+          <a:p>
+            <a:r>
+              <a:rPr lang="bg-BG" dirty="0"/>
+              <a:t>Създаване на параметрична заявка</a:t>
+            </a:r>
+            <a:r>
+              <a:rPr lang="en-US" dirty="0"/>
+              <a:t> (4)</a:t>
+            </a:r>
+          </a:p>
+        </p:txBody>
+      </p:sp>
+      <p:pic>
+        <p:nvPicPr>
+          <p:cNvPr id="11" name="Picture 10">
+            <a:extLst>
+              <a:ext uri="{FF2B5EF4-FFF2-40B4-BE49-F238E27FC236}">
+                <a16:creationId xmlns:a16="http://schemas.microsoft.com/office/drawing/2014/main" id="{7BA4212F-36BE-E0CB-5FA5-09147718C3C4}"/>
+              </a:ext>
+            </a:extLst>
+          </p:cNvPr>
+          <p:cNvPicPr>
+            <a:picLocks noChangeAspect="1"/>
+          </p:cNvPicPr>
+          <p:nvPr/>
+        </p:nvPicPr>
+        <p:blipFill>
+          <a:blip r:embed="rId2"/>
+          <a:stretch>
+            <a:fillRect/>
+          </a:stretch>
+        </p:blipFill>
+        <p:spPr>
+          <a:xfrm>
+            <a:off x="3503328" y="2304000"/>
+            <a:ext cx="5185343" cy="1125000"/>
+          </a:xfrm>
+          <a:prstGeom prst="rect">
+            <a:avLst/>
+          </a:prstGeom>
+          <a:ln>
+            <a:solidFill>
+              <a:schemeClr val="bg2">
+                <a:lumMod val="75000"/>
+              </a:schemeClr>
+            </a:solidFill>
+          </a:ln>
+        </p:spPr>
+      </p:pic>
+      <p:pic>
+        <p:nvPicPr>
+          <p:cNvPr id="15" name="Picture 14">
+            <a:extLst>
+              <a:ext uri="{FF2B5EF4-FFF2-40B4-BE49-F238E27FC236}">
+                <a16:creationId xmlns:a16="http://schemas.microsoft.com/office/drawing/2014/main" id="{EFD12EAD-EDEE-E98E-B325-2CBB31F05358}"/>
+              </a:ext>
+            </a:extLst>
+          </p:cNvPr>
+          <p:cNvPicPr>
+            <a:picLocks noChangeAspect="1"/>
+          </p:cNvPicPr>
+          <p:nvPr/>
+        </p:nvPicPr>
+        <p:blipFill>
+          <a:blip r:embed="rId3"/>
+          <a:stretch>
+            <a:fillRect/>
+          </a:stretch>
+        </p:blipFill>
+        <p:spPr>
+          <a:xfrm>
+            <a:off x="1168559" y="5211838"/>
+            <a:ext cx="4669537" cy="1035000"/>
+          </a:xfrm>
+          <a:prstGeom prst="rect">
+            <a:avLst/>
+          </a:prstGeom>
+          <a:ln>
+            <a:solidFill>
+              <a:schemeClr val="bg2">
+                <a:lumMod val="75000"/>
+              </a:schemeClr>
+            </a:solidFill>
+          </a:ln>
+        </p:spPr>
+      </p:pic>
+      <p:pic>
+        <p:nvPicPr>
+          <p:cNvPr id="17" name="Picture 16">
+            <a:extLst>
+              <a:ext uri="{FF2B5EF4-FFF2-40B4-BE49-F238E27FC236}">
+                <a16:creationId xmlns:a16="http://schemas.microsoft.com/office/drawing/2014/main" id="{836F76DC-AEA9-EBBD-7E0A-9C39573B0F4A}"/>
+              </a:ext>
+            </a:extLst>
+          </p:cNvPr>
+          <p:cNvPicPr>
+            <a:picLocks noChangeAspect="1"/>
+          </p:cNvPicPr>
+          <p:nvPr/>
+        </p:nvPicPr>
+        <p:blipFill>
+          <a:blip r:embed="rId4"/>
+          <a:stretch>
+            <a:fillRect/>
+          </a:stretch>
+        </p:blipFill>
+        <p:spPr>
+          <a:xfrm>
+            <a:off x="7251103" y="4977163"/>
+            <a:ext cx="2758164" cy="1530000"/>
+          </a:xfrm>
+          <a:prstGeom prst="rect">
+            <a:avLst/>
+          </a:prstGeom>
+          <a:ln>
+            <a:solidFill>
+              <a:schemeClr val="bg2">
+                <a:lumMod val="75000"/>
+              </a:schemeClr>
+            </a:solidFill>
+          </a:ln>
+        </p:spPr>
+      </p:pic>
+    </p:spTree>
+    <p:extLst>
+      <p:ext uri="{BB962C8B-B14F-4D97-AF65-F5344CB8AC3E}">
+        <p14:creationId xmlns:p14="http://schemas.microsoft.com/office/powerpoint/2010/main" val="2460511268"/>
+      </p:ext>
+    </p:extLst>
+  </p:cSld>
+  <p:clrMapOvr>
+    <a:masterClrMapping/>
+  </p:clrMapOvr>
+  <mc:AlternateContent xmlns:mc="http://schemas.openxmlformats.org/markup-compatibility/2006" xmlns:p14="http://schemas.microsoft.com/office/powerpoint/2010/main">
+    <mc:Choice Requires="p14">
+      <p:transition spd="slow" p14:dur="2000" advClick="0" advTm="5000"/>
+    </mc:Choice>
+    <mc:Fallback xmlns="">
+      <p:transition spd="slow" advClick="0" advTm="5000"/>
+    </mc:Fallback>
+  </mc:AlternateContent>
+  <p:timing>
+    <p:tnLst>
+      <p:par>
+        <p:cTn id="1" dur="indefinite" restart="never" nodeType="tmRoot">
+          <p:childTnLst>
+            <p:seq concurrent="1" nextAc="seek">
+              <p:cTn id="2" dur="indefinite" nodeType="mainSeq">
+                <p:childTnLst>
+                  <p:par>
+                    <p:cTn id="3" fill="hold">
+                      <p:stCondLst>
+                        <p:cond delay="indefinite"/>
+                      </p:stCondLst>
+                      <p:childTnLst>
+                        <p:par>
+                          <p:cTn id="4" fill="hold">
+                            <p:stCondLst>
+                              <p:cond delay="0"/>
+                            </p:stCondLst>
+                            <p:childTnLst>
+                              <p:par>
+                                <p:cTn id="5" presetID="1" presetClass="entr" presetSubtype="0" fill="hold" nodeType="clickEffect">
+                                  <p:stCondLst>
+                                    <p:cond delay="0"/>
+                                  </p:stCondLst>
+                                  <p:childTnLst>
+                                    <p:set>
+                                      <p:cBhvr>
+                                        <p:cTn id="6" dur="1" fill="hold">
+                                          <p:stCondLst>
+                                            <p:cond delay="0"/>
+                                          </p:stCondLst>
+                                        </p:cTn>
+                                        <p:tgtEl>
+                                          <p:spTgt spid="3">
+                                            <p:txEl>
+                                              <p:pRg st="3" end="3"/>
+                                            </p:txEl>
+                                          </p:spTgt>
+                                        </p:tgtEl>
+                                        <p:attrNameLst>
+                                          <p:attrName>style.visibility</p:attrName>
+                                        </p:attrNameLst>
+                                      </p:cBhvr>
+                                      <p:to>
+                                        <p:strVal val="visible"/>
+                                      </p:to>
+                                    </p:set>
+                                  </p:childTnLst>
+                                </p:cTn>
+                              </p:par>
+                              <p:par>
+                                <p:cTn id="7" presetID="1" presetClass="entr" presetSubtype="0" fill="hold" nodeType="withEffect">
+                                  <p:stCondLst>
+                                    <p:cond delay="0"/>
+                                  </p:stCondLst>
+                                  <p:childTnLst>
+                                    <p:set>
+                                      <p:cBhvr>
+                                        <p:cTn id="8" dur="1" fill="hold">
+                                          <p:stCondLst>
+                                            <p:cond delay="0"/>
+                                          </p:stCondLst>
+                                        </p:cTn>
+                                        <p:tgtEl>
+                                          <p:spTgt spid="15"/>
+                                        </p:tgtEl>
+                                        <p:attrNameLst>
+                                          <p:attrName>style.visibility</p:attrName>
+                                        </p:attrNameLst>
+                                      </p:cBhvr>
+                                      <p:to>
+                                        <p:strVal val="visible"/>
+                                      </p:to>
+                                    </p:set>
+                                  </p:childTnLst>
+                                </p:cTn>
+                              </p:par>
+                            </p:childTnLst>
+                          </p:cTn>
+                        </p:par>
+                      </p:childTnLst>
+                    </p:cTn>
+                  </p:par>
+                  <p:par>
+                    <p:cTn id="9" fill="hold">
+                      <p:stCondLst>
+                        <p:cond delay="indefinite"/>
+                      </p:stCondLst>
+                      <p:childTnLst>
+                        <p:par>
+                          <p:cTn id="10" fill="hold">
+                            <p:stCondLst>
+                              <p:cond delay="0"/>
+                            </p:stCondLst>
+                            <p:childTnLst>
+                              <p:par>
+                                <p:cTn id="11" presetID="1" presetClass="entr" presetSubtype="0" fill="hold" nodeType="clickEffect">
+                                  <p:stCondLst>
+                                    <p:cond delay="0"/>
+                                  </p:stCondLst>
+                                  <p:childTnLst>
+                                    <p:set>
+                                      <p:cBhvr>
+                                        <p:cTn id="12" dur="1" fill="hold">
+                                          <p:stCondLst>
+                                            <p:cond delay="0"/>
+                                          </p:stCondLst>
+                                        </p:cTn>
+                                        <p:tgtEl>
+                                          <p:spTgt spid="17"/>
+                                        </p:tgtEl>
+                                        <p:attrNameLst>
+                                          <p:attrName>style.visibility</p:attrName>
+                                        </p:attrNameLst>
+                                      </p:cBhvr>
+                                      <p:to>
+                                        <p:strVal val="visible"/>
+                                      </p:to>
+                                    </p:set>
+                                  </p:childTnLst>
+                                </p:cTn>
+                              </p:par>
+                            </p:childTnLst>
+                          </p:cTn>
+                        </p:par>
+                      </p:childTnLst>
+                    </p:cTn>
+                  </p:par>
+                </p:childTnLst>
+              </p:cTn>
+              <p:prevCondLst>
+                <p:cond evt="onPrev" delay="0">
+                  <p:tgtEl>
+                    <p:sldTgt/>
+                  </p:tgtEl>
+                </p:cond>
+              </p:prevCondLst>
+              <p:nextCondLst>
+                <p:cond evt="onNext" delay="0">
+                  <p:tgtEl>
+                    <p:sldTgt/>
+                  </p:tgtEl>
+                </p:cond>
+              </p:nextCondLst>
+            </p:seq>
+          </p:childTnLst>
+        </p:cTn>
+      </p:par>
+    </p:tnLst>
+  </p:timing>
+</p:sld>
+</file>
+
+<file path=ppt/slides/slide19.xml><?xml version="1.0" encoding="utf-8"?>
+<p:sld xmlns:a="http://schemas.openxmlformats.org/drawingml/2006/main" xmlns:r="http://schemas.openxmlformats.org/officeDocument/2006/relationships" xmlns:p="http://schemas.openxmlformats.org/presentationml/2006/main">
+  <p:cSld>
+    <p:spTree>
+      <p:nvGrpSpPr>
+        <p:cNvPr id="1" name=""/>
+        <p:cNvGrpSpPr/>
+        <p:nvPr/>
+      </p:nvGrpSpPr>
+      <p:grpSpPr>
+        <a:xfrm>
+          <a:off x="0" y="0"/>
+          <a:ext cx="0" cy="0"/>
+          <a:chOff x="0" y="0"/>
+          <a:chExt cx="0" cy="0"/>
+        </a:xfrm>
+      </p:grpSpPr>
       <p:pic>
         <p:nvPicPr>
           <p:cNvPr id="56322" name="Picture 2" descr="What is Google Forms?"/>
@@ -12297,236 +12818,6 @@
     <p:extLst>
       <p:ext uri="{BB962C8B-B14F-4D97-AF65-F5344CB8AC3E}">
         <p14:creationId xmlns:p14="http://schemas.microsoft.com/office/powerpoint/2010/main" val="1519194040"/>
-      </p:ext>
-    </p:extLst>
-  </p:cSld>
-  <p:clrMapOvr>
-    <a:masterClrMapping/>
-  </p:clrMapOvr>
-  <mc:AlternateContent xmlns:mc="http://schemas.openxmlformats.org/markup-compatibility/2006" xmlns:p14="http://schemas.microsoft.com/office/powerpoint/2010/main">
-    <mc:Choice Requires="p14">
-      <p:transition spd="slow" p14:dur="2000" advClick="0" advTm="5000"/>
-    </mc:Choice>
-    <mc:Fallback xmlns="">
-      <p:transition spd="slow" advClick="0" advTm="5000"/>
-    </mc:Fallback>
-  </mc:AlternateContent>
-</p:sld>
-</file>
-
-<file path=ppt/slides/slide19.xml><?xml version="1.0" encoding="utf-8"?>
-<p:sld xmlns:a="http://schemas.openxmlformats.org/drawingml/2006/main" xmlns:r="http://schemas.openxmlformats.org/officeDocument/2006/relationships" xmlns:p="http://schemas.openxmlformats.org/presentationml/2006/main">
-  <p:cSld>
-    <p:spTree>
-      <p:nvGrpSpPr>
-        <p:cNvPr id="1" name=""/>
-        <p:cNvGrpSpPr/>
-        <p:nvPr/>
-      </p:nvGrpSpPr>
-      <p:grpSpPr>
-        <a:xfrm>
-          <a:off x="0" y="0"/>
-          <a:ext cx="0" cy="0"/>
-          <a:chOff x="0" y="0"/>
-          <a:chExt cx="0" cy="0"/>
-        </a:xfrm>
-      </p:grpSpPr>
-      <p:sp>
-        <p:nvSpPr>
-          <p:cNvPr id="3" name="Text Placeholder 2"/>
-          <p:cNvSpPr>
-            <a:spLocks noGrp="1"/>
-          </p:cNvSpPr>
-          <p:nvPr>
-            <p:ph type="body" sz="quarter" idx="10"/>
-          </p:nvPr>
-        </p:nvSpPr>
-        <p:spPr/>
-        <p:txBody>
-          <a:bodyPr>
-            <a:normAutofit/>
-          </a:bodyPr>
-          <a:lstStyle/>
-          <a:p>
-            <a:pPr>
-              <a:buClr>
-                <a:schemeClr val="tx1"/>
-              </a:buClr>
-            </a:pPr>
-            <a:r>
-              <a:rPr lang="ru-RU" b="1" dirty="0">
-                <a:solidFill>
-                  <a:schemeClr val="bg1"/>
-                </a:solidFill>
-              </a:rPr>
-              <a:t>Формулярите</a:t>
-            </a:r>
-            <a:r>
-              <a:rPr lang="ru-RU" dirty="0"/>
-              <a:t> в </a:t>
-            </a:r>
-            <a:r>
-              <a:rPr lang="en-US" dirty="0"/>
-              <a:t>MS Access</a:t>
-            </a:r>
-            <a:r>
-              <a:rPr lang="bg-BG" dirty="0"/>
-              <a:t> са</a:t>
-            </a:r>
-            <a:r>
-              <a:rPr lang="ru-RU" dirty="0"/>
-              <a:t> </a:t>
-            </a:r>
-            <a:r>
-              <a:rPr lang="bg-BG" b="1" dirty="0"/>
-              <a:t>потребителски интерфейси </a:t>
-            </a:r>
-            <a:r>
-              <a:rPr lang="bg-BG" dirty="0"/>
-              <a:t>за </a:t>
-            </a:r>
-            <a:r>
-              <a:rPr lang="bg-BG" b="1" dirty="0"/>
-              <a:t>преглед</a:t>
-            </a:r>
-            <a:r>
-              <a:rPr lang="bg-BG" dirty="0"/>
-              <a:t> / </a:t>
-            </a:r>
-            <a:r>
-              <a:rPr lang="bg-BG" b="1" dirty="0"/>
-              <a:t>въвеждане</a:t>
-            </a:r>
-            <a:r>
-              <a:rPr lang="bg-BG" dirty="0"/>
-              <a:t> / </a:t>
-            </a:r>
-            <a:r>
-              <a:rPr lang="bg-BG" b="1" dirty="0"/>
-              <a:t>редакция</a:t>
-            </a:r>
-            <a:r>
-              <a:rPr lang="bg-BG" dirty="0"/>
-              <a:t> на данни</a:t>
-            </a:r>
-            <a:endParaRPr lang="en-US" dirty="0"/>
-          </a:p>
-        </p:txBody>
-      </p:sp>
-      <p:sp>
-        <p:nvSpPr>
-          <p:cNvPr id="4" name="Title 3"/>
-          <p:cNvSpPr>
-            <a:spLocks noGrp="1"/>
-          </p:cNvSpPr>
-          <p:nvPr>
-            <p:ph type="title"/>
-          </p:nvPr>
-        </p:nvSpPr>
-        <p:spPr/>
-        <p:txBody>
-          <a:bodyPr/>
-          <a:lstStyle/>
-          <a:p>
-            <a:r>
-              <a:rPr lang="bg-BG" dirty="0"/>
-              <a:t>Формуляри в </a:t>
-            </a:r>
-            <a:r>
-              <a:rPr lang="en-US" dirty="0"/>
-              <a:t>MS Access </a:t>
-            </a:r>
-            <a:r>
-              <a:rPr lang="bg-BG" dirty="0"/>
-              <a:t>(1)</a:t>
-            </a:r>
-            <a:endParaRPr lang="en-US" dirty="0"/>
-          </a:p>
-        </p:txBody>
-      </p:sp>
-      <p:sp>
-        <p:nvSpPr>
-          <p:cNvPr id="5" name="Slide Number">
-            <a:extLst>
-              <a:ext uri="{FF2B5EF4-FFF2-40B4-BE49-F238E27FC236}">
-                <a16:creationId xmlns:a16="http://schemas.microsoft.com/office/drawing/2014/main" id="{9195FAD7-3D6C-C32F-4967-052E881A790D}"/>
-              </a:ext>
-            </a:extLst>
-          </p:cNvPr>
-          <p:cNvSpPr>
-            <a:spLocks noGrp="1"/>
-          </p:cNvSpPr>
-          <p:nvPr>
-            <p:ph type="sldNum" sz="quarter" idx="5"/>
-          </p:nvPr>
-        </p:nvSpPr>
-        <p:spPr>
-          <a:xfrm>
-            <a:off x="11753030" y="6507000"/>
-            <a:ext cx="367414" cy="297000"/>
-          </a:xfrm>
-          <a:prstGeom prst="rect">
-            <a:avLst/>
-          </a:prstGeom>
-        </p:spPr>
-        <p:txBody>
-          <a:bodyPr vert="horz" lIns="91440" tIns="45720" rIns="91440" bIns="45720" rtlCol="0" anchor="b"/>
-          <a:lstStyle>
-            <a:lvl1pPr algn="r">
-              <a:defRPr sz="1000"/>
-            </a:lvl1pPr>
-          </a:lstStyle>
-          <a:p>
-            <a:fld id="{2BF067CD-8E6B-4360-9AA8-C5DF2A48A6D1}" type="slidenum">
-              <a:rPr lang="en-US" noProof="0" smtClean="0"/>
-              <a:pPr/>
-              <a:t>19</a:t>
-            </a:fld>
-            <a:endParaRPr lang="en-US" noProof="0" dirty="0"/>
-          </a:p>
-        </p:txBody>
-      </p:sp>
-      <p:pic>
-        <p:nvPicPr>
-          <p:cNvPr id="6" name="Picture 5">
-            <a:extLst>
-              <a:ext uri="{FF2B5EF4-FFF2-40B4-BE49-F238E27FC236}">
-                <a16:creationId xmlns:a16="http://schemas.microsoft.com/office/drawing/2014/main" id="{7C572E06-7025-DDEA-58F8-CEBF3932F8D7}"/>
-              </a:ext>
-            </a:extLst>
-          </p:cNvPr>
-          <p:cNvPicPr>
-            <a:picLocks noChangeAspect="1"/>
-          </p:cNvPicPr>
-          <p:nvPr/>
-        </p:nvPicPr>
-        <p:blipFill>
-          <a:blip r:embed="rId2"/>
-          <a:stretch>
-            <a:fillRect/>
-          </a:stretch>
-        </p:blipFill>
-        <p:spPr>
-          <a:xfrm>
-            <a:off x="2643187" y="2579876"/>
-            <a:ext cx="6905625" cy="4067175"/>
-          </a:xfrm>
-          <a:prstGeom prst="rect">
-            <a:avLst/>
-          </a:prstGeom>
-          <a:ln>
-            <a:solidFill>
-              <a:schemeClr val="bg2">
-                <a:lumMod val="75000"/>
-              </a:schemeClr>
-            </a:solidFill>
-          </a:ln>
-        </p:spPr>
-      </p:pic>
-    </p:spTree>
-    <p:extLst>
-      <p:ext uri="{BB962C8B-B14F-4D97-AF65-F5344CB8AC3E}">
-        <p14:creationId xmlns:p14="http://schemas.microsoft.com/office/powerpoint/2010/main" val="599633598"/>
       </p:ext>
     </p:extLst>
   </p:cSld>
@@ -13107,6 +13398,236 @@
         </p:nvSpPr>
         <p:spPr/>
         <p:txBody>
+          <a:bodyPr>
+            <a:normAutofit/>
+          </a:bodyPr>
+          <a:lstStyle/>
+          <a:p>
+            <a:pPr>
+              <a:buClr>
+                <a:schemeClr val="tx1"/>
+              </a:buClr>
+            </a:pPr>
+            <a:r>
+              <a:rPr lang="ru-RU" b="1" dirty="0">
+                <a:solidFill>
+                  <a:schemeClr val="bg1"/>
+                </a:solidFill>
+              </a:rPr>
+              <a:t>Формулярите</a:t>
+            </a:r>
+            <a:r>
+              <a:rPr lang="ru-RU" dirty="0"/>
+              <a:t> в </a:t>
+            </a:r>
+            <a:r>
+              <a:rPr lang="en-US" dirty="0"/>
+              <a:t>MS Access</a:t>
+            </a:r>
+            <a:r>
+              <a:rPr lang="bg-BG" dirty="0"/>
+              <a:t> са</a:t>
+            </a:r>
+            <a:r>
+              <a:rPr lang="ru-RU" dirty="0"/>
+              <a:t> </a:t>
+            </a:r>
+            <a:r>
+              <a:rPr lang="bg-BG" b="1" dirty="0"/>
+              <a:t>потребителски интерфейси </a:t>
+            </a:r>
+            <a:r>
+              <a:rPr lang="bg-BG" dirty="0"/>
+              <a:t>за </a:t>
+            </a:r>
+            <a:r>
+              <a:rPr lang="bg-BG" b="1" dirty="0"/>
+              <a:t>преглед</a:t>
+            </a:r>
+            <a:r>
+              <a:rPr lang="bg-BG" dirty="0"/>
+              <a:t> / </a:t>
+            </a:r>
+            <a:r>
+              <a:rPr lang="bg-BG" b="1" dirty="0"/>
+              <a:t>въвеждане</a:t>
+            </a:r>
+            <a:r>
+              <a:rPr lang="bg-BG" dirty="0"/>
+              <a:t> / </a:t>
+            </a:r>
+            <a:r>
+              <a:rPr lang="bg-BG" b="1" dirty="0"/>
+              <a:t>редакция</a:t>
+            </a:r>
+            <a:r>
+              <a:rPr lang="bg-BG" dirty="0"/>
+              <a:t> на данни</a:t>
+            </a:r>
+            <a:endParaRPr lang="en-US" dirty="0"/>
+          </a:p>
+        </p:txBody>
+      </p:sp>
+      <p:sp>
+        <p:nvSpPr>
+          <p:cNvPr id="4" name="Title 3"/>
+          <p:cNvSpPr>
+            <a:spLocks noGrp="1"/>
+          </p:cNvSpPr>
+          <p:nvPr>
+            <p:ph type="title"/>
+          </p:nvPr>
+        </p:nvSpPr>
+        <p:spPr/>
+        <p:txBody>
+          <a:bodyPr/>
+          <a:lstStyle/>
+          <a:p>
+            <a:r>
+              <a:rPr lang="bg-BG" dirty="0"/>
+              <a:t>Формуляри в </a:t>
+            </a:r>
+            <a:r>
+              <a:rPr lang="en-US" dirty="0"/>
+              <a:t>MS Access </a:t>
+            </a:r>
+            <a:r>
+              <a:rPr lang="bg-BG" dirty="0"/>
+              <a:t>(1)</a:t>
+            </a:r>
+            <a:endParaRPr lang="en-US" dirty="0"/>
+          </a:p>
+        </p:txBody>
+      </p:sp>
+      <p:sp>
+        <p:nvSpPr>
+          <p:cNvPr id="5" name="Slide Number">
+            <a:extLst>
+              <a:ext uri="{FF2B5EF4-FFF2-40B4-BE49-F238E27FC236}">
+                <a16:creationId xmlns:a16="http://schemas.microsoft.com/office/drawing/2014/main" id="{9195FAD7-3D6C-C32F-4967-052E881A790D}"/>
+              </a:ext>
+            </a:extLst>
+          </p:cNvPr>
+          <p:cNvSpPr>
+            <a:spLocks noGrp="1"/>
+          </p:cNvSpPr>
+          <p:nvPr>
+            <p:ph type="sldNum" sz="quarter" idx="5"/>
+          </p:nvPr>
+        </p:nvSpPr>
+        <p:spPr>
+          <a:xfrm>
+            <a:off x="11753030" y="6507000"/>
+            <a:ext cx="367414" cy="297000"/>
+          </a:xfrm>
+          <a:prstGeom prst="rect">
+            <a:avLst/>
+          </a:prstGeom>
+        </p:spPr>
+        <p:txBody>
+          <a:bodyPr vert="horz" lIns="91440" tIns="45720" rIns="91440" bIns="45720" rtlCol="0" anchor="b"/>
+          <a:lstStyle>
+            <a:lvl1pPr algn="r">
+              <a:defRPr sz="1000"/>
+            </a:lvl1pPr>
+          </a:lstStyle>
+          <a:p>
+            <a:fld id="{2BF067CD-8E6B-4360-9AA8-C5DF2A48A6D1}" type="slidenum">
+              <a:rPr lang="en-US" noProof="0" smtClean="0"/>
+              <a:pPr/>
+              <a:t>20</a:t>
+            </a:fld>
+            <a:endParaRPr lang="en-US" noProof="0" dirty="0"/>
+          </a:p>
+        </p:txBody>
+      </p:sp>
+      <p:pic>
+        <p:nvPicPr>
+          <p:cNvPr id="6" name="Picture 5">
+            <a:extLst>
+              <a:ext uri="{FF2B5EF4-FFF2-40B4-BE49-F238E27FC236}">
+                <a16:creationId xmlns:a16="http://schemas.microsoft.com/office/drawing/2014/main" id="{7C572E06-7025-DDEA-58F8-CEBF3932F8D7}"/>
+              </a:ext>
+            </a:extLst>
+          </p:cNvPr>
+          <p:cNvPicPr>
+            <a:picLocks noChangeAspect="1"/>
+          </p:cNvPicPr>
+          <p:nvPr/>
+        </p:nvPicPr>
+        <p:blipFill>
+          <a:blip r:embed="rId2"/>
+          <a:stretch>
+            <a:fillRect/>
+          </a:stretch>
+        </p:blipFill>
+        <p:spPr>
+          <a:xfrm>
+            <a:off x="2643187" y="2579876"/>
+            <a:ext cx="6905625" cy="4067175"/>
+          </a:xfrm>
+          <a:prstGeom prst="rect">
+            <a:avLst/>
+          </a:prstGeom>
+          <a:ln>
+            <a:solidFill>
+              <a:schemeClr val="bg2">
+                <a:lumMod val="75000"/>
+              </a:schemeClr>
+            </a:solidFill>
+          </a:ln>
+        </p:spPr>
+      </p:pic>
+    </p:spTree>
+    <p:extLst>
+      <p:ext uri="{BB962C8B-B14F-4D97-AF65-F5344CB8AC3E}">
+        <p14:creationId xmlns:p14="http://schemas.microsoft.com/office/powerpoint/2010/main" val="599633598"/>
+      </p:ext>
+    </p:extLst>
+  </p:cSld>
+  <p:clrMapOvr>
+    <a:masterClrMapping/>
+  </p:clrMapOvr>
+  <mc:AlternateContent xmlns:mc="http://schemas.openxmlformats.org/markup-compatibility/2006" xmlns:p14="http://schemas.microsoft.com/office/powerpoint/2010/main">
+    <mc:Choice Requires="p14">
+      <p:transition spd="slow" p14:dur="2000" advClick="0" advTm="5000"/>
+    </mc:Choice>
+    <mc:Fallback xmlns="">
+      <p:transition spd="slow" advClick="0" advTm="5000"/>
+    </mc:Fallback>
+  </mc:AlternateContent>
+</p:sld>
+</file>
+
+<file path=ppt/slides/slide21.xml><?xml version="1.0" encoding="utf-8"?>
+<p:sld xmlns:a="http://schemas.openxmlformats.org/drawingml/2006/main" xmlns:r="http://schemas.openxmlformats.org/officeDocument/2006/relationships" xmlns:p="http://schemas.openxmlformats.org/presentationml/2006/main">
+  <p:cSld>
+    <p:spTree>
+      <p:nvGrpSpPr>
+        <p:cNvPr id="1" name=""/>
+        <p:cNvGrpSpPr/>
+        <p:nvPr/>
+      </p:nvGrpSpPr>
+      <p:grpSpPr>
+        <a:xfrm>
+          <a:off x="0" y="0"/>
+          <a:ext cx="0" cy="0"/>
+          <a:chOff x="0" y="0"/>
+          <a:chExt cx="0" cy="0"/>
+        </a:xfrm>
+      </p:grpSpPr>
+      <p:sp>
+        <p:nvSpPr>
+          <p:cNvPr id="3" name="Text Placeholder 2"/>
+          <p:cNvSpPr>
+            <a:spLocks noGrp="1"/>
+          </p:cNvSpPr>
+          <p:nvPr>
+            <p:ph type="body" sz="quarter" idx="10"/>
+          </p:nvPr>
+        </p:nvSpPr>
+        <p:spPr/>
+        <p:txBody>
           <a:bodyPr/>
           <a:lstStyle/>
           <a:p>
@@ -13314,7 +13835,7 @@
             <a:fld id="{2BF067CD-8E6B-4360-9AA8-C5DF2A48A6D1}" type="slidenum">
               <a:rPr lang="en-US" noProof="0" smtClean="0"/>
               <a:pPr/>
-              <a:t>20</a:t>
+              <a:t>21</a:t>
             </a:fld>
             <a:endParaRPr lang="en-US" noProof="0" dirty="0"/>
           </a:p>
@@ -13567,7 +14088,7 @@
 </p:sld>
 </file>
 
-<file path=ppt/slides/slide21.xml><?xml version="1.0" encoding="utf-8"?>
+<file path=ppt/slides/slide22.xml><?xml version="1.0" encoding="utf-8"?>
 <p:sld xmlns:a="http://schemas.openxmlformats.org/drawingml/2006/main" xmlns:r="http://schemas.openxmlformats.org/officeDocument/2006/relationships" xmlns:p="http://schemas.openxmlformats.org/presentationml/2006/main">
   <p:cSld>
     <p:spTree>
@@ -13843,7 +14364,7 @@
             <a:fld id="{2BF067CD-8E6B-4360-9AA8-C5DF2A48A6D1}" type="slidenum">
               <a:rPr lang="en-US" noProof="0" smtClean="0"/>
               <a:pPr/>
-              <a:t>21</a:t>
+              <a:t>22</a:t>
             </a:fld>
             <a:endParaRPr lang="en-US" noProof="0" dirty="0"/>
           </a:p>
@@ -14025,7 +14546,7 @@
 </p:sld>
 </file>
 
-<file path=ppt/slides/slide22.xml><?xml version="1.0" encoding="utf-8"?>
+<file path=ppt/slides/slide23.xml><?xml version="1.0" encoding="utf-8"?>
 <p:sld xmlns:a="http://schemas.openxmlformats.org/drawingml/2006/main" xmlns:r="http://schemas.openxmlformats.org/officeDocument/2006/relationships" xmlns:p="http://schemas.openxmlformats.org/presentationml/2006/main">
   <p:cSld>
     <p:spTree>
@@ -14299,7 +14820,7 @@
             <a:fld id="{2BF067CD-8E6B-4360-9AA8-C5DF2A48A6D1}" type="slidenum">
               <a:rPr lang="en-US" noProof="0" smtClean="0"/>
               <a:pPr/>
-              <a:t>22</a:t>
+              <a:t>23</a:t>
             </a:fld>
             <a:endParaRPr lang="en-US" noProof="0" dirty="0"/>
           </a:p>
@@ -14526,7 +15047,7 @@
 </p:sld>
 </file>
 
-<file path=ppt/slides/slide23.xml><?xml version="1.0" encoding="utf-8"?>
+<file path=ppt/slides/slide24.xml><?xml version="1.0" encoding="utf-8"?>
 <p:sld xmlns:a="http://schemas.openxmlformats.org/drawingml/2006/main" xmlns:r="http://schemas.openxmlformats.org/officeDocument/2006/relationships" xmlns:p="http://schemas.openxmlformats.org/presentationml/2006/main">
   <p:cSld>
     <p:spTree>
@@ -14567,7 +15088,7 @@
             <a:fld id="{2BF067CD-8E6B-4360-9AA8-C5DF2A48A6D1}" type="slidenum">
               <a:rPr lang="en-US" noProof="0" smtClean="0"/>
               <a:pPr/>
-              <a:t>23</a:t>
+              <a:t>24</a:t>
             </a:fld>
             <a:endParaRPr lang="en-US" noProof="0" dirty="0"/>
           </a:p>
@@ -14716,7 +15237,7 @@
 </p:sld>
 </file>
 
-<file path=ppt/slides/slide24.xml><?xml version="1.0" encoding="utf-8"?>
+<file path=ppt/slides/slide25.xml><?xml version="1.0" encoding="utf-8"?>
 <p:sld xmlns:a="http://schemas.openxmlformats.org/drawingml/2006/main" xmlns:r="http://schemas.openxmlformats.org/officeDocument/2006/relationships" xmlns:p="http://schemas.openxmlformats.org/presentationml/2006/main">
   <p:cSld>
     <p:spTree>
@@ -14846,7 +15367,7 @@
 </p:sld>
 </file>
 
-<file path=ppt/slides/slide25.xml><?xml version="1.0" encoding="utf-8"?>
+<file path=ppt/slides/slide26.xml><?xml version="1.0" encoding="utf-8"?>
 <p:sld xmlns:a="http://schemas.openxmlformats.org/drawingml/2006/main" xmlns:r="http://schemas.openxmlformats.org/officeDocument/2006/relationships" xmlns:p="http://schemas.openxmlformats.org/presentationml/2006/main">
   <p:cSld>
     <p:spTree>
@@ -15145,7 +15666,7 @@
             <a:fld id="{2BF067CD-8E6B-4360-9AA8-C5DF2A48A6D1}" type="slidenum">
               <a:rPr lang="en-US" noProof="0" smtClean="0"/>
               <a:pPr/>
-              <a:t>25</a:t>
+              <a:t>26</a:t>
             </a:fld>
             <a:endParaRPr lang="en-US" noProof="0" dirty="0"/>
           </a:p>
@@ -15429,7 +15950,7 @@
 </p:sld>
 </file>
 
-<file path=ppt/slides/slide26.xml><?xml version="1.0" encoding="utf-8"?>
+<file path=ppt/slides/slide27.xml><?xml version="1.0" encoding="utf-8"?>
 <p:sld xmlns:a="http://schemas.openxmlformats.org/drawingml/2006/main" xmlns:r="http://schemas.openxmlformats.org/officeDocument/2006/relationships" xmlns:p="http://schemas.openxmlformats.org/presentationml/2006/main">
   <p:cSld>
     <p:spTree>
@@ -15763,7 +16284,7 @@
             <a:fld id="{2BF067CD-8E6B-4360-9AA8-C5DF2A48A6D1}" type="slidenum">
               <a:rPr lang="en-US" noProof="0" smtClean="0"/>
               <a:pPr/>
-              <a:t>26</a:t>
+              <a:t>27</a:t>
             </a:fld>
             <a:endParaRPr lang="en-US" noProof="0" dirty="0"/>
           </a:p>
@@ -16016,7 +16537,7 @@
 </p:sld>
 </file>
 
-<file path=ppt/slides/slide27.xml><?xml version="1.0" encoding="utf-8"?>
+<file path=ppt/slides/slide28.xml><?xml version="1.0" encoding="utf-8"?>
 <p:sld xmlns:a="http://schemas.openxmlformats.org/drawingml/2006/main" xmlns:r="http://schemas.openxmlformats.org/officeDocument/2006/relationships" xmlns:p="http://schemas.openxmlformats.org/presentationml/2006/main">
   <p:cSld>
     <p:spTree>
@@ -16242,7 +16763,7 @@
             <a:fld id="{2BF067CD-8E6B-4360-9AA8-C5DF2A48A6D1}" type="slidenum">
               <a:rPr lang="en-US" noProof="0" smtClean="0"/>
               <a:pPr/>
-              <a:t>27</a:t>
+              <a:t>28</a:t>
             </a:fld>
             <a:endParaRPr lang="en-US" noProof="0" dirty="0"/>
           </a:p>
@@ -16348,7 +16869,7 @@
 </p:sld>
 </file>
 
-<file path=ppt/slides/slide28.xml><?xml version="1.0" encoding="utf-8"?>
+<file path=ppt/slides/slide29.xml><?xml version="1.0" encoding="utf-8"?>
 <p:sld xmlns:a="http://schemas.openxmlformats.org/drawingml/2006/main" xmlns:r="http://schemas.openxmlformats.org/officeDocument/2006/relationships" xmlns:p="http://schemas.openxmlformats.org/presentationml/2006/main">
   <p:cSld>
     <p:spTree>
@@ -18435,7 +18956,7 @@
             <a:fld id="{2BF067CD-8E6B-4360-9AA8-C5DF2A48A6D1}" type="slidenum">
               <a:rPr lang="en-US" noProof="0" smtClean="0"/>
               <a:pPr/>
-              <a:t>28</a:t>
+              <a:t>29</a:t>
             </a:fld>
             <a:endParaRPr lang="en-US" noProof="0" dirty="0"/>
           </a:p>
@@ -18462,7 +18983,146 @@
 </p:sld>
 </file>
 
-<file path=ppt/slides/slide29.xml><?xml version="1.0" encoding="utf-8"?>
+<file path=ppt/slides/slide3.xml><?xml version="1.0" encoding="utf-8"?>
+<p:sld xmlns:a="http://schemas.openxmlformats.org/drawingml/2006/main" xmlns:r="http://schemas.openxmlformats.org/officeDocument/2006/relationships" xmlns:p="http://schemas.openxmlformats.org/presentationml/2006/main">
+  <p:cSld>
+    <p:spTree>
+      <p:nvGrpSpPr>
+        <p:cNvPr id="1" name=""/>
+        <p:cNvGrpSpPr/>
+        <p:nvPr/>
+      </p:nvGrpSpPr>
+      <p:grpSpPr>
+        <a:xfrm>
+          <a:off x="0" y="0"/>
+          <a:ext cx="0" cy="0"/>
+          <a:chOff x="0" y="0"/>
+          <a:chExt cx="0" cy="0"/>
+        </a:xfrm>
+      </p:grpSpPr>
+      <p:sp>
+        <p:nvSpPr>
+          <p:cNvPr id="3" name="Subtitle 2">
+            <a:extLst>
+              <a:ext uri="{FF2B5EF4-FFF2-40B4-BE49-F238E27FC236}">
+                <a16:creationId xmlns:a16="http://schemas.microsoft.com/office/drawing/2014/main" id="{4806D0E4-A78E-F457-4E0B-2A2925EB2193}"/>
+              </a:ext>
+            </a:extLst>
+          </p:cNvPr>
+          <p:cNvSpPr>
+            <a:spLocks noGrp="1"/>
+          </p:cNvSpPr>
+          <p:nvPr>
+            <p:ph type="subTitle" sz="quarter" idx="11"/>
+          </p:nvPr>
+        </p:nvSpPr>
+        <p:spPr/>
+        <p:txBody>
+          <a:bodyPr/>
+          <a:lstStyle/>
+          <a:p>
+            <a:r>
+              <a:rPr lang="en-US" dirty="0"/>
+              <a:t>Employees.accdb</a:t>
+            </a:r>
+          </a:p>
+        </p:txBody>
+      </p:sp>
+      <p:sp>
+        <p:nvSpPr>
+          <p:cNvPr id="4" name="Заглавие 3">
+            <a:extLst>
+              <a:ext uri="{FF2B5EF4-FFF2-40B4-BE49-F238E27FC236}">
+                <a16:creationId xmlns:a16="http://schemas.microsoft.com/office/drawing/2014/main" id="{2829BCA0-DE74-B9D4-97E6-AD634E15716A}"/>
+              </a:ext>
+            </a:extLst>
+          </p:cNvPr>
+          <p:cNvSpPr>
+            <a:spLocks noGrp="1"/>
+          </p:cNvSpPr>
+          <p:nvPr>
+            <p:ph type="title" sz="quarter" idx="10"/>
+          </p:nvPr>
+        </p:nvSpPr>
+        <p:spPr>
+          <a:xfrm>
+            <a:off x="615109" y="4704825"/>
+            <a:ext cx="10961783" cy="768084"/>
+          </a:xfrm>
+        </p:spPr>
+        <p:txBody>
+          <a:bodyPr/>
+          <a:lstStyle/>
+          <a:p>
+            <a:r>
+              <a:rPr lang="bg-BG" dirty="0"/>
+              <a:t>База данни </a:t>
+            </a:r>
+            <a:r>
+              <a:rPr lang="en-US" dirty="0"/>
+              <a:t>Employees</a:t>
+            </a:r>
+            <a:endParaRPr lang="bg-BG" dirty="0"/>
+          </a:p>
+        </p:txBody>
+      </p:sp>
+      <p:pic>
+        <p:nvPicPr>
+          <p:cNvPr id="5" name="Picture 4" descr="A circular object with a logo on it&#10;&#10;Description automatically generated">
+            <a:extLst>
+              <a:ext uri="{FF2B5EF4-FFF2-40B4-BE49-F238E27FC236}">
+                <a16:creationId xmlns:a16="http://schemas.microsoft.com/office/drawing/2014/main" id="{05E6D692-5BCE-531A-0346-B2DEDE501A60}"/>
+              </a:ext>
+            </a:extLst>
+          </p:cNvPr>
+          <p:cNvPicPr>
+            <a:picLocks noChangeAspect="1"/>
+          </p:cNvPicPr>
+          <p:nvPr/>
+        </p:nvPicPr>
+        <p:blipFill rotWithShape="1">
+          <a:blip r:embed="rId2">
+            <a:extLst>
+              <a:ext uri="{28A0092B-C50C-407E-A947-70E740481C1C}">
+                <a14:useLocalDpi xmlns:a14="http://schemas.microsoft.com/office/drawing/2010/main" val="0"/>
+              </a:ext>
+            </a:extLst>
+          </a:blip>
+          <a:srcRect l="15721" t="17303" r="14539" b="15321"/>
+          <a:stretch/>
+        </p:blipFill>
+        <p:spPr>
+          <a:xfrm>
+            <a:off x="4628763" y="1224000"/>
+            <a:ext cx="2934474" cy="2835000"/>
+          </a:xfrm>
+          <a:prstGeom prst="ellipse">
+            <a:avLst/>
+          </a:prstGeom>
+        </p:spPr>
+      </p:pic>
+    </p:spTree>
+    <p:extLst>
+      <p:ext uri="{BB962C8B-B14F-4D97-AF65-F5344CB8AC3E}">
+        <p14:creationId xmlns:p14="http://schemas.microsoft.com/office/powerpoint/2010/main" val="849526289"/>
+      </p:ext>
+    </p:extLst>
+  </p:cSld>
+  <p:clrMapOvr>
+    <a:masterClrMapping/>
+  </p:clrMapOvr>
+  <mc:AlternateContent xmlns:mc="http://schemas.openxmlformats.org/markup-compatibility/2006" xmlns:p14="http://schemas.microsoft.com/office/powerpoint/2010/main">
+    <mc:Choice Requires="p14">
+      <p:transition spd="slow" p14:dur="2000" advClick="0" advTm="5000"/>
+    </mc:Choice>
+    <mc:Fallback xmlns="">
+      <p:transition spd="slow" advClick="0" advTm="5000"/>
+    </mc:Fallback>
+  </mc:AlternateContent>
+</p:sld>
+</file>
+
+<file path=ppt/slides/slide30.xml><?xml version="1.0" encoding="utf-8"?>
 <p:sld xmlns:a="http://schemas.openxmlformats.org/drawingml/2006/main" xmlns:r="http://schemas.openxmlformats.org/officeDocument/2006/relationships" xmlns:p="http://schemas.openxmlformats.org/presentationml/2006/main">
   <p:cSld>
     <p:spTree>
@@ -18685,7 +19345,7 @@
             <a:fld id="{2BF067CD-8E6B-4360-9AA8-C5DF2A48A6D1}" type="slidenum">
               <a:rPr lang="en-US" noProof="0" smtClean="0"/>
               <a:pPr/>
-              <a:t>29</a:t>
+              <a:t>30</a:t>
             </a:fld>
             <a:endParaRPr lang="en-US" noProof="0" dirty="0"/>
           </a:p>
@@ -18953,146 +19613,7 @@
 </p:sld>
 </file>
 
-<file path=ppt/slides/slide3.xml><?xml version="1.0" encoding="utf-8"?>
-<p:sld xmlns:a="http://schemas.openxmlformats.org/drawingml/2006/main" xmlns:r="http://schemas.openxmlformats.org/officeDocument/2006/relationships" xmlns:p="http://schemas.openxmlformats.org/presentationml/2006/main">
-  <p:cSld>
-    <p:spTree>
-      <p:nvGrpSpPr>
-        <p:cNvPr id="1" name=""/>
-        <p:cNvGrpSpPr/>
-        <p:nvPr/>
-      </p:nvGrpSpPr>
-      <p:grpSpPr>
-        <a:xfrm>
-          <a:off x="0" y="0"/>
-          <a:ext cx="0" cy="0"/>
-          <a:chOff x="0" y="0"/>
-          <a:chExt cx="0" cy="0"/>
-        </a:xfrm>
-      </p:grpSpPr>
-      <p:sp>
-        <p:nvSpPr>
-          <p:cNvPr id="3" name="Subtitle 2">
-            <a:extLst>
-              <a:ext uri="{FF2B5EF4-FFF2-40B4-BE49-F238E27FC236}">
-                <a16:creationId xmlns:a16="http://schemas.microsoft.com/office/drawing/2014/main" id="{4806D0E4-A78E-F457-4E0B-2A2925EB2193}"/>
-              </a:ext>
-            </a:extLst>
-          </p:cNvPr>
-          <p:cNvSpPr>
-            <a:spLocks noGrp="1"/>
-          </p:cNvSpPr>
-          <p:nvPr>
-            <p:ph type="subTitle" sz="quarter" idx="11"/>
-          </p:nvPr>
-        </p:nvSpPr>
-        <p:spPr/>
-        <p:txBody>
-          <a:bodyPr/>
-          <a:lstStyle/>
-          <a:p>
-            <a:r>
-              <a:rPr lang="en-US" dirty="0"/>
-              <a:t>Employees.accdb</a:t>
-            </a:r>
-          </a:p>
-        </p:txBody>
-      </p:sp>
-      <p:sp>
-        <p:nvSpPr>
-          <p:cNvPr id="4" name="Заглавие 3">
-            <a:extLst>
-              <a:ext uri="{FF2B5EF4-FFF2-40B4-BE49-F238E27FC236}">
-                <a16:creationId xmlns:a16="http://schemas.microsoft.com/office/drawing/2014/main" id="{2829BCA0-DE74-B9D4-97E6-AD634E15716A}"/>
-              </a:ext>
-            </a:extLst>
-          </p:cNvPr>
-          <p:cNvSpPr>
-            <a:spLocks noGrp="1"/>
-          </p:cNvSpPr>
-          <p:nvPr>
-            <p:ph type="title" sz="quarter" idx="10"/>
-          </p:nvPr>
-        </p:nvSpPr>
-        <p:spPr>
-          <a:xfrm>
-            <a:off x="615109" y="4704825"/>
-            <a:ext cx="10961783" cy="768084"/>
-          </a:xfrm>
-        </p:spPr>
-        <p:txBody>
-          <a:bodyPr/>
-          <a:lstStyle/>
-          <a:p>
-            <a:r>
-              <a:rPr lang="bg-BG" dirty="0"/>
-              <a:t>База данни </a:t>
-            </a:r>
-            <a:r>
-              <a:rPr lang="en-US" dirty="0"/>
-              <a:t>Employees</a:t>
-            </a:r>
-            <a:endParaRPr lang="bg-BG" dirty="0"/>
-          </a:p>
-        </p:txBody>
-      </p:sp>
-      <p:pic>
-        <p:nvPicPr>
-          <p:cNvPr id="5" name="Picture 4" descr="A circular object with a logo on it&#10;&#10;Description automatically generated">
-            <a:extLst>
-              <a:ext uri="{FF2B5EF4-FFF2-40B4-BE49-F238E27FC236}">
-                <a16:creationId xmlns:a16="http://schemas.microsoft.com/office/drawing/2014/main" id="{05E6D692-5BCE-531A-0346-B2DEDE501A60}"/>
-              </a:ext>
-            </a:extLst>
-          </p:cNvPr>
-          <p:cNvPicPr>
-            <a:picLocks noChangeAspect="1"/>
-          </p:cNvPicPr>
-          <p:nvPr/>
-        </p:nvPicPr>
-        <p:blipFill rotWithShape="1">
-          <a:blip r:embed="rId2">
-            <a:extLst>
-              <a:ext uri="{28A0092B-C50C-407E-A947-70E740481C1C}">
-                <a14:useLocalDpi xmlns:a14="http://schemas.microsoft.com/office/drawing/2010/main" val="0"/>
-              </a:ext>
-            </a:extLst>
-          </a:blip>
-          <a:srcRect l="15721" t="17303" r="14539" b="15321"/>
-          <a:stretch/>
-        </p:blipFill>
-        <p:spPr>
-          <a:xfrm>
-            <a:off x="4628763" y="1224000"/>
-            <a:ext cx="2934474" cy="2835000"/>
-          </a:xfrm>
-          <a:prstGeom prst="ellipse">
-            <a:avLst/>
-          </a:prstGeom>
-        </p:spPr>
-      </p:pic>
-    </p:spTree>
-    <p:extLst>
-      <p:ext uri="{BB962C8B-B14F-4D97-AF65-F5344CB8AC3E}">
-        <p14:creationId xmlns:p14="http://schemas.microsoft.com/office/powerpoint/2010/main" val="849526289"/>
-      </p:ext>
-    </p:extLst>
-  </p:cSld>
-  <p:clrMapOvr>
-    <a:masterClrMapping/>
-  </p:clrMapOvr>
-  <mc:AlternateContent xmlns:mc="http://schemas.openxmlformats.org/markup-compatibility/2006" xmlns:p14="http://schemas.microsoft.com/office/powerpoint/2010/main">
-    <mc:Choice Requires="p14">
-      <p:transition spd="slow" p14:dur="2000" advClick="0" advTm="5000"/>
-    </mc:Choice>
-    <mc:Fallback xmlns="">
-      <p:transition spd="slow" advClick="0" advTm="5000"/>
-    </mc:Fallback>
-  </mc:AlternateContent>
-</p:sld>
-</file>
-
-<file path=ppt/slides/slide30.xml><?xml version="1.0" encoding="utf-8"?>
+<file path=ppt/slides/slide31.xml><?xml version="1.0" encoding="utf-8"?>
 <p:sld xmlns:a="http://schemas.openxmlformats.org/drawingml/2006/main" xmlns:r="http://schemas.openxmlformats.org/officeDocument/2006/relationships" xmlns:p="http://schemas.openxmlformats.org/presentationml/2006/main">
   <p:cSld>
     <p:spTree>
@@ -19353,7 +19874,7 @@
             <a:fld id="{2BF067CD-8E6B-4360-9AA8-C5DF2A48A6D1}" type="slidenum">
               <a:rPr lang="en-US" noProof="0" smtClean="0"/>
               <a:pPr/>
-              <a:t>30</a:t>
+              <a:t>31</a:t>
             </a:fld>
             <a:endParaRPr lang="en-US" noProof="0" dirty="0"/>
           </a:p>
@@ -19704,7 +20225,7 @@
 </p:sld>
 </file>
 
-<file path=ppt/slides/slide31.xml><?xml version="1.0" encoding="utf-8"?>
+<file path=ppt/slides/slide32.xml><?xml version="1.0" encoding="utf-8"?>
 <p:sld xmlns:a="http://schemas.openxmlformats.org/drawingml/2006/main" xmlns:r="http://schemas.openxmlformats.org/officeDocument/2006/relationships" xmlns:p="http://schemas.openxmlformats.org/presentationml/2006/main">
   <p:cSld>
     <p:spTree>
@@ -19745,7 +20266,7 @@
             <a:fld id="{2BF067CD-8E6B-4360-9AA8-C5DF2A48A6D1}" type="slidenum">
               <a:rPr lang="en-US" noProof="0" smtClean="0"/>
               <a:pPr/>
-              <a:t>31</a:t>
+              <a:t>32</a:t>
             </a:fld>
             <a:endParaRPr lang="en-US" noProof="0" dirty="0"/>
           </a:p>
@@ -20166,7 +20687,7 @@
 </p:sld>
 </file>
 
-<file path=ppt/slides/slide32.xml><?xml version="1.0" encoding="utf-8"?>
+<file path=ppt/slides/slide33.xml><?xml version="1.0" encoding="utf-8"?>
 <p:sld xmlns:a="http://schemas.openxmlformats.org/drawingml/2006/main" xmlns:r="http://schemas.openxmlformats.org/officeDocument/2006/relationships" xmlns:p="http://schemas.openxmlformats.org/presentationml/2006/main">
   <p:cSld>
     <p:spTree>
@@ -20207,7 +20728,7 @@
             <a:fld id="{2BF067CD-8E6B-4360-9AA8-C5DF2A48A6D1}" type="slidenum">
               <a:rPr lang="en-US" noProof="0" smtClean="0"/>
               <a:pPr/>
-              <a:t>32</a:t>
+              <a:t>33</a:t>
             </a:fld>
             <a:endParaRPr lang="en-US" noProof="0" dirty="0"/>
           </a:p>
@@ -20701,7 +21222,7 @@
 </p:sld>
 </file>
 
-<file path=ppt/slides/slide33.xml><?xml version="1.0" encoding="utf-8"?>
+<file path=ppt/slides/slide34.xml><?xml version="1.0" encoding="utf-8"?>
 <p:sld xmlns:a="http://schemas.openxmlformats.org/drawingml/2006/main" xmlns:r="http://schemas.openxmlformats.org/officeDocument/2006/relationships" xmlns:p="http://schemas.openxmlformats.org/presentationml/2006/main">
   <p:cSld>
     <p:spTree>
@@ -20747,7 +21268,7 @@
             <a:fld id="{2BF067CD-8E6B-4360-9AA8-C5DF2A48A6D1}" type="slidenum">
               <a:rPr lang="en-US" noProof="0" smtClean="0"/>
               <a:pPr/>
-              <a:t>33</a:t>
+              <a:t>34</a:t>
             </a:fld>
             <a:endParaRPr lang="en-US" noProof="0" dirty="0"/>
           </a:p>
@@ -21326,7 +21847,7 @@
 </p:sld>
 </file>
 
-<file path=ppt/slides/slide34.xml><?xml version="1.0" encoding="utf-8"?>
+<file path=ppt/slides/slide35.xml><?xml version="1.0" encoding="utf-8"?>
 <p:sld xmlns:a="http://schemas.openxmlformats.org/drawingml/2006/main" xmlns:r="http://schemas.openxmlformats.org/officeDocument/2006/relationships" xmlns:p="http://schemas.openxmlformats.org/presentationml/2006/main">
   <p:cSld>
     <p:spTree>
@@ -21367,7 +21888,7 @@
             <a:fld id="{2BF067CD-8E6B-4360-9AA8-C5DF2A48A6D1}" type="slidenum">
               <a:rPr lang="en-US" noProof="0" smtClean="0"/>
               <a:pPr/>
-              <a:t>34</a:t>
+              <a:t>35</a:t>
             </a:fld>
             <a:endParaRPr lang="en-US" noProof="0" dirty="0"/>
           </a:p>
@@ -21677,7 +22198,7 @@
 </p:sld>
 </file>
 
-<file path=ppt/slides/slide35.xml><?xml version="1.0" encoding="utf-8"?>
+<file path=ppt/slides/slide36.xml><?xml version="1.0" encoding="utf-8"?>
 <p:sld xmlns:a="http://schemas.openxmlformats.org/drawingml/2006/main" xmlns:r="http://schemas.openxmlformats.org/officeDocument/2006/relationships" xmlns:p="http://schemas.openxmlformats.org/presentationml/2006/main">
   <p:cSld>
     <p:spTree>
@@ -22545,7 +23066,7 @@
             <a:fld id="{2BF067CD-8E6B-4360-9AA8-C5DF2A48A6D1}" type="slidenum">
               <a:rPr lang="en-US" noProof="0" smtClean="0"/>
               <a:pPr/>
-              <a:t>35</a:t>
+              <a:t>36</a:t>
             </a:fld>
             <a:endParaRPr lang="en-US" noProof="0" dirty="0"/>
           </a:p>
@@ -22878,7 +23399,7 @@
 </p:sld>
 </file>
 
-<file path=ppt/slides/slide36.xml><?xml version="1.0" encoding="utf-8"?>
+<file path=ppt/slides/slide37.xml><?xml version="1.0" encoding="utf-8"?>
 <p:sld xmlns:a="http://schemas.openxmlformats.org/drawingml/2006/main" xmlns:r="http://schemas.openxmlformats.org/officeDocument/2006/relationships" xmlns:p="http://schemas.openxmlformats.org/presentationml/2006/main">
   <p:cSld>
     <p:spTree>
@@ -23068,7 +23589,7 @@
 </p:sld>
 </file>
 
-<file path=ppt/slides/slide37.xml><?xml version="1.0" encoding="utf-8"?>
+<file path=ppt/slides/slide38.xml><?xml version="1.0" encoding="utf-8"?>
 <p:sld xmlns:a="http://schemas.openxmlformats.org/drawingml/2006/main" xmlns:r="http://schemas.openxmlformats.org/officeDocument/2006/relationships" xmlns:p="http://schemas.openxmlformats.org/presentationml/2006/main" show="0">
   <p:cSld>
     <p:spTree>
@@ -23424,7 +23945,7 @@
             <a:fld id="{2BF067CD-8E6B-4360-9AA8-C5DF2A48A6D1}" type="slidenum">
               <a:rPr lang="en-US" noProof="0" smtClean="0"/>
               <a:pPr/>
-              <a:t>37</a:t>
+              <a:t>38</a:t>
             </a:fld>
             <a:endParaRPr lang="en-US" noProof="0" dirty="0"/>
           </a:p>

</xml_diff>

<commit_message>
Changes on Access slides
</commit_message>
<xml_diff>
--- a/Courses/Software-Sciences/Module-3-Databases-New/13-MS-Access/13-MS-Access-Queries-Forms-Reports.pptx
+++ b/Courses/Software-Sciences/Module-3-Databases-New/13-MS-Access/13-MS-Access-Queries-Forms-Reports.pptx
@@ -333,7 +333,7 @@
           <a:p>
             <a:fld id="{4E087215-0C8F-4762-A664-737A353EC9A4}" type="datetimeFigureOut">
               <a:rPr lang="bg-BG" smtClean="0"/>
-              <a:t>26.8.2024 г.</a:t>
+              <a:t>30.8.2024 г.</a:t>
             </a:fld>
             <a:endParaRPr lang="bg-BG"/>
           </a:p>
@@ -529,7 +529,7 @@
           <a:p>
             <a:fld id="{72D84649-876A-46C9-8472-14CB09C070D8}" type="datetimeFigureOut">
               <a:rPr lang="en-US" smtClean="0"/>
-              <a:t>8/26/2024</a:t>
+              <a:t>8/30/2024</a:t>
             </a:fld>
             <a:endParaRPr lang="en-US"/>
           </a:p>
@@ -15621,7 +15621,7 @@
         </p:blipFill>
         <p:spPr bwMode="auto">
           <a:xfrm>
-            <a:off x="8610600" y="1904999"/>
+            <a:off x="8616000" y="2019299"/>
             <a:ext cx="2819400" cy="2819401"/>
           </a:xfrm>
           <a:prstGeom prst="rect">

</xml_diff>